<commit_message>
completed up to lesson 32
</commit_message>
<xml_diff>
--- a/Course Notes.pptx
+++ b/Course Notes.pptx
@@ -9,6 +9,9 @@
     <p:sldId id="257" r:id="rId3"/>
     <p:sldId id="258" r:id="rId4"/>
     <p:sldId id="259" r:id="rId5"/>
+    <p:sldId id="260" r:id="rId6"/>
+    <p:sldId id="261" r:id="rId7"/>
+    <p:sldId id="262" r:id="rId8"/>
   </p:sldIdLst>
   <p:sldSz cx="12192000" cy="6858000"/>
   <p:notesSz cx="6858000" cy="9144000"/>
@@ -262,7 +265,7 @@
           <a:p>
             <a:fld id="{60001D16-9F9F-DD4B-B82C-1EB7F87D30FC}" type="datetimeFigureOut">
               <a:rPr lang="en-US" smtClean="0"/>
-              <a:t>1/5/25</a:t>
+              <a:t>1/19/25</a:t>
             </a:fld>
             <a:endParaRPr lang="en-US"/>
           </a:p>
@@ -460,7 +463,7 @@
           <a:p>
             <a:fld id="{60001D16-9F9F-DD4B-B82C-1EB7F87D30FC}" type="datetimeFigureOut">
               <a:rPr lang="en-US" smtClean="0"/>
-              <a:t>1/5/25</a:t>
+              <a:t>1/19/25</a:t>
             </a:fld>
             <a:endParaRPr lang="en-US"/>
           </a:p>
@@ -668,7 +671,7 @@
           <a:p>
             <a:fld id="{60001D16-9F9F-DD4B-B82C-1EB7F87D30FC}" type="datetimeFigureOut">
               <a:rPr lang="en-US" smtClean="0"/>
-              <a:t>1/5/25</a:t>
+              <a:t>1/19/25</a:t>
             </a:fld>
             <a:endParaRPr lang="en-US"/>
           </a:p>
@@ -866,7 +869,7 @@
           <a:p>
             <a:fld id="{60001D16-9F9F-DD4B-B82C-1EB7F87D30FC}" type="datetimeFigureOut">
               <a:rPr lang="en-US" smtClean="0"/>
-              <a:t>1/5/25</a:t>
+              <a:t>1/19/25</a:t>
             </a:fld>
             <a:endParaRPr lang="en-US"/>
           </a:p>
@@ -1141,7 +1144,7 @@
           <a:p>
             <a:fld id="{60001D16-9F9F-DD4B-B82C-1EB7F87D30FC}" type="datetimeFigureOut">
               <a:rPr lang="en-US" smtClean="0"/>
-              <a:t>1/5/25</a:t>
+              <a:t>1/19/25</a:t>
             </a:fld>
             <a:endParaRPr lang="en-US"/>
           </a:p>
@@ -1406,7 +1409,7 @@
           <a:p>
             <a:fld id="{60001D16-9F9F-DD4B-B82C-1EB7F87D30FC}" type="datetimeFigureOut">
               <a:rPr lang="en-US" smtClean="0"/>
-              <a:t>1/5/25</a:t>
+              <a:t>1/19/25</a:t>
             </a:fld>
             <a:endParaRPr lang="en-US"/>
           </a:p>
@@ -1818,7 +1821,7 @@
           <a:p>
             <a:fld id="{60001D16-9F9F-DD4B-B82C-1EB7F87D30FC}" type="datetimeFigureOut">
               <a:rPr lang="en-US" smtClean="0"/>
-              <a:t>1/5/25</a:t>
+              <a:t>1/19/25</a:t>
             </a:fld>
             <a:endParaRPr lang="en-US"/>
           </a:p>
@@ -1959,7 +1962,7 @@
           <a:p>
             <a:fld id="{60001D16-9F9F-DD4B-B82C-1EB7F87D30FC}" type="datetimeFigureOut">
               <a:rPr lang="en-US" smtClean="0"/>
-              <a:t>1/5/25</a:t>
+              <a:t>1/19/25</a:t>
             </a:fld>
             <a:endParaRPr lang="en-US"/>
           </a:p>
@@ -2072,7 +2075,7 @@
           <a:p>
             <a:fld id="{60001D16-9F9F-DD4B-B82C-1EB7F87D30FC}" type="datetimeFigureOut">
               <a:rPr lang="en-US" smtClean="0"/>
-              <a:t>1/5/25</a:t>
+              <a:t>1/19/25</a:t>
             </a:fld>
             <a:endParaRPr lang="en-US"/>
           </a:p>
@@ -2383,7 +2386,7 @@
           <a:p>
             <a:fld id="{60001D16-9F9F-DD4B-B82C-1EB7F87D30FC}" type="datetimeFigureOut">
               <a:rPr lang="en-US" smtClean="0"/>
-              <a:t>1/5/25</a:t>
+              <a:t>1/19/25</a:t>
             </a:fld>
             <a:endParaRPr lang="en-US"/>
           </a:p>
@@ -2671,7 +2674,7 @@
           <a:p>
             <a:fld id="{60001D16-9F9F-DD4B-B82C-1EB7F87D30FC}" type="datetimeFigureOut">
               <a:rPr lang="en-US" smtClean="0"/>
-              <a:t>1/5/25</a:t>
+              <a:t>1/19/25</a:t>
             </a:fld>
             <a:endParaRPr lang="en-US"/>
           </a:p>
@@ -2912,7 +2915,7 @@
           <a:p>
             <a:fld id="{60001D16-9F9F-DD4B-B82C-1EB7F87D30FC}" type="datetimeFigureOut">
               <a:rPr lang="en-US" smtClean="0"/>
-              <a:t>1/5/25</a:t>
+              <a:t>1/19/25</a:t>
             </a:fld>
             <a:endParaRPr lang="en-US"/>
           </a:p>
@@ -4167,6 +4170,455 @@
 </p:sld>
 </file>
 
+<file path=ppt/slides/slide5.xml><?xml version="1.0" encoding="utf-8"?>
+<p:sld xmlns:a="http://schemas.openxmlformats.org/drawingml/2006/main" xmlns:r="http://schemas.openxmlformats.org/officeDocument/2006/relationships" xmlns:p="http://schemas.openxmlformats.org/presentationml/2006/main">
+  <p:cSld>
+    <p:spTree>
+      <p:nvGrpSpPr>
+        <p:cNvPr id="1" name=""/>
+        <p:cNvGrpSpPr/>
+        <p:nvPr/>
+      </p:nvGrpSpPr>
+      <p:grpSpPr>
+        <a:xfrm>
+          <a:off x="0" y="0"/>
+          <a:ext cx="0" cy="0"/>
+          <a:chOff x="0" y="0"/>
+          <a:chExt cx="0" cy="0"/>
+        </a:xfrm>
+      </p:grpSpPr>
+      <p:sp>
+        <p:nvSpPr>
+          <p:cNvPr id="2" name="Title 1">
+            <a:extLst>
+              <a:ext uri="{FF2B5EF4-FFF2-40B4-BE49-F238E27FC236}">
+                <a16:creationId xmlns:a16="http://schemas.microsoft.com/office/drawing/2014/main" id="{80751304-2BD6-0588-4079-336EE5758D3A}"/>
+              </a:ext>
+            </a:extLst>
+          </p:cNvPr>
+          <p:cNvSpPr>
+            <a:spLocks noGrp="1"/>
+          </p:cNvSpPr>
+          <p:nvPr>
+            <p:ph type="title"/>
+          </p:nvPr>
+        </p:nvSpPr>
+        <p:spPr/>
+        <p:txBody>
+          <a:bodyPr/>
+          <a:lstStyle/>
+          <a:p>
+            <a:r>
+              <a:rPr lang="en-US" dirty="0" err="1"/>
+              <a:t>mergeSequential</a:t>
+            </a:r>
+            <a:r>
+              <a:rPr lang="en-US" dirty="0"/>
+              <a:t>()</a:t>
+            </a:r>
+          </a:p>
+        </p:txBody>
+      </p:sp>
+      <p:sp>
+        <p:nvSpPr>
+          <p:cNvPr id="3" name="Content Placeholder 2">
+            <a:extLst>
+              <a:ext uri="{FF2B5EF4-FFF2-40B4-BE49-F238E27FC236}">
+                <a16:creationId xmlns:a16="http://schemas.microsoft.com/office/drawing/2014/main" id="{3BE1AAA5-7508-42E3-B405-6BEF02A40C0B}"/>
+              </a:ext>
+            </a:extLst>
+          </p:cNvPr>
+          <p:cNvSpPr>
+            <a:spLocks noGrp="1"/>
+          </p:cNvSpPr>
+          <p:nvPr>
+            <p:ph idx="1"/>
+          </p:nvPr>
+        </p:nvSpPr>
+        <p:spPr/>
+        <p:txBody>
+          <a:bodyPr/>
+          <a:lstStyle/>
+          <a:p>
+            <a:r>
+              <a:rPr lang="en-US" dirty="0"/>
+              <a:t>Used to combine two Publisher(Flux) in to one</a:t>
+            </a:r>
+          </a:p>
+          <a:p>
+            <a:r>
+              <a:rPr lang="en-US" dirty="0"/>
+              <a:t>Static method in Flux</a:t>
+            </a:r>
+          </a:p>
+          <a:p>
+            <a:r>
+              <a:rPr lang="en-US" dirty="0"/>
+              <a:t>Both the publishers are subscribed at the same time</a:t>
+            </a:r>
+          </a:p>
+          <a:p>
+            <a:pPr lvl="1"/>
+            <a:r>
+              <a:rPr lang="en-US" dirty="0"/>
+              <a:t>Publisher are subscribed eagerly</a:t>
+            </a:r>
+          </a:p>
+          <a:p>
+            <a:pPr lvl="1"/>
+            <a:r>
+              <a:rPr lang="en-US" dirty="0"/>
+              <a:t>Even though the publishers are subscribed eagerly the merge happens in a sequence</a:t>
+            </a:r>
+          </a:p>
+        </p:txBody>
+      </p:sp>
+    </p:spTree>
+    <p:extLst>
+      <p:ext uri="{BB962C8B-B14F-4D97-AF65-F5344CB8AC3E}">
+        <p14:creationId xmlns:p14="http://schemas.microsoft.com/office/powerpoint/2010/main" val="70790010"/>
+      </p:ext>
+    </p:extLst>
+  </p:cSld>
+  <p:clrMapOvr>
+    <a:masterClrMapping/>
+  </p:clrMapOvr>
+</p:sld>
+</file>
+
+<file path=ppt/slides/slide6.xml><?xml version="1.0" encoding="utf-8"?>
+<p:sld xmlns:a="http://schemas.openxmlformats.org/drawingml/2006/main" xmlns:r="http://schemas.openxmlformats.org/officeDocument/2006/relationships" xmlns:p="http://schemas.openxmlformats.org/presentationml/2006/main">
+  <p:cSld>
+    <p:spTree>
+      <p:nvGrpSpPr>
+        <p:cNvPr id="1" name=""/>
+        <p:cNvGrpSpPr/>
+        <p:nvPr/>
+      </p:nvGrpSpPr>
+      <p:grpSpPr>
+        <a:xfrm>
+          <a:off x="0" y="0"/>
+          <a:ext cx="0" cy="0"/>
+          <a:chOff x="0" y="0"/>
+          <a:chExt cx="0" cy="0"/>
+        </a:xfrm>
+      </p:grpSpPr>
+      <p:sp>
+        <p:nvSpPr>
+          <p:cNvPr id="2" name="Title 1">
+            <a:extLst>
+              <a:ext uri="{FF2B5EF4-FFF2-40B4-BE49-F238E27FC236}">
+                <a16:creationId xmlns:a16="http://schemas.microsoft.com/office/drawing/2014/main" id="{6A73D9BF-CBE6-02C1-A949-AF81353D1FCE}"/>
+              </a:ext>
+            </a:extLst>
+          </p:cNvPr>
+          <p:cNvSpPr>
+            <a:spLocks noGrp="1"/>
+          </p:cNvSpPr>
+          <p:nvPr>
+            <p:ph type="title"/>
+          </p:nvPr>
+        </p:nvSpPr>
+        <p:spPr/>
+        <p:txBody>
+          <a:bodyPr/>
+          <a:lstStyle/>
+          <a:p>
+            <a:r>
+              <a:rPr lang="en-US" dirty="0"/>
+              <a:t>Zip() &amp; </a:t>
+            </a:r>
+            <a:r>
+              <a:rPr lang="en-US" dirty="0" err="1"/>
+              <a:t>zipWith</a:t>
+            </a:r>
+            <a:r>
+              <a:rPr lang="en-US" dirty="0"/>
+              <a:t>()</a:t>
+            </a:r>
+          </a:p>
+        </p:txBody>
+      </p:sp>
+      <p:sp>
+        <p:nvSpPr>
+          <p:cNvPr id="3" name="Content Placeholder 2">
+            <a:extLst>
+              <a:ext uri="{FF2B5EF4-FFF2-40B4-BE49-F238E27FC236}">
+                <a16:creationId xmlns:a16="http://schemas.microsoft.com/office/drawing/2014/main" id="{27C21793-02F4-1CFB-3F5A-C855ABA9D3E4}"/>
+              </a:ext>
+            </a:extLst>
+          </p:cNvPr>
+          <p:cNvSpPr>
+            <a:spLocks noGrp="1"/>
+          </p:cNvSpPr>
+          <p:nvPr>
+            <p:ph idx="1"/>
+          </p:nvPr>
+        </p:nvSpPr>
+        <p:spPr>
+          <a:xfrm>
+            <a:off x="838200" y="1527243"/>
+            <a:ext cx="10515600" cy="4649720"/>
+          </a:xfrm>
+        </p:spPr>
+        <p:txBody>
+          <a:bodyPr>
+            <a:normAutofit lnSpcReduction="10000"/>
+          </a:bodyPr>
+          <a:lstStyle/>
+          <a:p>
+            <a:r>
+              <a:rPr lang="en-US" dirty="0"/>
+              <a:t>zip()</a:t>
+            </a:r>
+          </a:p>
+          <a:p>
+            <a:pPr lvl="1"/>
+            <a:r>
+              <a:rPr lang="en-US" dirty="0"/>
+              <a:t>Static method that’s part of the Flux</a:t>
+            </a:r>
+          </a:p>
+          <a:p>
+            <a:pPr lvl="1"/>
+            <a:r>
+              <a:rPr lang="en-US" dirty="0"/>
+              <a:t>Can be merge up-to 2 to 8 Publishers (Flux or Mono) in to one</a:t>
+            </a:r>
+          </a:p>
+          <a:p>
+            <a:pPr lvl="1"/>
+            <a:endParaRPr lang="en-US" dirty="0"/>
+          </a:p>
+          <a:p>
+            <a:r>
+              <a:rPr lang="en-US" dirty="0" err="1"/>
+              <a:t>zipWith</a:t>
+            </a:r>
+            <a:r>
+              <a:rPr lang="en-US" dirty="0"/>
+              <a:t>()</a:t>
+            </a:r>
+          </a:p>
+          <a:p>
+            <a:pPr lvl="1"/>
+            <a:r>
+              <a:rPr lang="en-US" dirty="0"/>
+              <a:t>This is an instance method that’s part of the Flux and Mono</a:t>
+            </a:r>
+          </a:p>
+          <a:p>
+            <a:pPr lvl="1"/>
+            <a:r>
+              <a:rPr lang="en-US" dirty="0"/>
+              <a:t>Used to merge two Publishers into one</a:t>
+            </a:r>
+          </a:p>
+          <a:p>
+            <a:r>
+              <a:rPr lang="en-US" dirty="0"/>
+              <a:t>Publishers are subscribed eagerly</a:t>
+            </a:r>
+          </a:p>
+          <a:p>
+            <a:r>
+              <a:rPr lang="en-US" dirty="0"/>
+              <a:t>Waits for all the Publishers involved in the transformation to emit one element</a:t>
+            </a:r>
+          </a:p>
+          <a:p>
+            <a:pPr lvl="1"/>
+            <a:r>
+              <a:rPr lang="en-US" dirty="0"/>
+              <a:t>Continues until one publisher send an </a:t>
+            </a:r>
+            <a:r>
+              <a:rPr lang="en-US" dirty="0" err="1"/>
+              <a:t>onComplete</a:t>
+            </a:r>
+            <a:r>
+              <a:rPr lang="en-US" dirty="0"/>
+              <a:t> event</a:t>
+            </a:r>
+          </a:p>
+        </p:txBody>
+      </p:sp>
+    </p:spTree>
+    <p:extLst>
+      <p:ext uri="{BB962C8B-B14F-4D97-AF65-F5344CB8AC3E}">
+        <p14:creationId xmlns:p14="http://schemas.microsoft.com/office/powerpoint/2010/main" val="3736735486"/>
+      </p:ext>
+    </p:extLst>
+  </p:cSld>
+  <p:clrMapOvr>
+    <a:masterClrMapping/>
+  </p:clrMapOvr>
+</p:sld>
+</file>
+
+<file path=ppt/slides/slide7.xml><?xml version="1.0" encoding="utf-8"?>
+<p:sld xmlns:a="http://schemas.openxmlformats.org/drawingml/2006/main" xmlns:r="http://schemas.openxmlformats.org/officeDocument/2006/relationships" xmlns:p="http://schemas.openxmlformats.org/presentationml/2006/main">
+  <p:cSld>
+    <p:spTree>
+      <p:nvGrpSpPr>
+        <p:cNvPr id="1" name=""/>
+        <p:cNvGrpSpPr/>
+        <p:nvPr/>
+      </p:nvGrpSpPr>
+      <p:grpSpPr>
+        <a:xfrm>
+          <a:off x="0" y="0"/>
+          <a:ext cx="0" cy="0"/>
+          <a:chOff x="0" y="0"/>
+          <a:chExt cx="0" cy="0"/>
+        </a:xfrm>
+      </p:grpSpPr>
+      <p:pic>
+        <p:nvPicPr>
+          <p:cNvPr id="5" name="Content Placeholder 4">
+            <a:extLst>
+              <a:ext uri="{FF2B5EF4-FFF2-40B4-BE49-F238E27FC236}">
+                <a16:creationId xmlns:a16="http://schemas.microsoft.com/office/drawing/2014/main" id="{24EFE328-CEC8-5BC8-272C-8F8D633A5172}"/>
+              </a:ext>
+            </a:extLst>
+          </p:cNvPr>
+          <p:cNvPicPr>
+            <a:picLocks noGrp="1" noChangeAspect="1"/>
+          </p:cNvPicPr>
+          <p:nvPr>
+            <p:ph idx="1"/>
+          </p:nvPr>
+        </p:nvPicPr>
+        <p:blipFill>
+          <a:blip r:embed="rId2"/>
+          <a:stretch>
+            <a:fillRect/>
+          </a:stretch>
+        </p:blipFill>
+        <p:spPr>
+          <a:xfrm>
+            <a:off x="1283781" y="767674"/>
+            <a:ext cx="9903028" cy="2426439"/>
+          </a:xfrm>
+        </p:spPr>
+      </p:pic>
+      <p:pic>
+        <p:nvPicPr>
+          <p:cNvPr id="7" name="Picture 6">
+            <a:extLst>
+              <a:ext uri="{FF2B5EF4-FFF2-40B4-BE49-F238E27FC236}">
+                <a16:creationId xmlns:a16="http://schemas.microsoft.com/office/drawing/2014/main" id="{CE4019A3-E481-B515-025F-259121D9E0D1}"/>
+              </a:ext>
+            </a:extLst>
+          </p:cNvPr>
+          <p:cNvPicPr>
+            <a:picLocks noChangeAspect="1"/>
+          </p:cNvPicPr>
+          <p:nvPr/>
+        </p:nvPicPr>
+        <p:blipFill>
+          <a:blip r:embed="rId3"/>
+          <a:stretch>
+            <a:fillRect/>
+          </a:stretch>
+        </p:blipFill>
+        <p:spPr>
+          <a:xfrm>
+            <a:off x="1283781" y="3897352"/>
+            <a:ext cx="6332976" cy="1847984"/>
+          </a:xfrm>
+          <a:prstGeom prst="rect">
+            <a:avLst/>
+          </a:prstGeom>
+        </p:spPr>
+      </p:pic>
+      <p:sp>
+        <p:nvSpPr>
+          <p:cNvPr id="9" name="TextBox 8">
+            <a:extLst>
+              <a:ext uri="{FF2B5EF4-FFF2-40B4-BE49-F238E27FC236}">
+                <a16:creationId xmlns:a16="http://schemas.microsoft.com/office/drawing/2014/main" id="{FBF9BB8A-EAEE-4E15-DB95-0220E729A2EC}"/>
+              </a:ext>
+            </a:extLst>
+          </p:cNvPr>
+          <p:cNvSpPr txBox="1"/>
+          <p:nvPr/>
+        </p:nvSpPr>
+        <p:spPr>
+          <a:xfrm>
+            <a:off x="1283781" y="291989"/>
+            <a:ext cx="591829" cy="369332"/>
+          </a:xfrm>
+          <a:prstGeom prst="rect">
+            <a:avLst/>
+          </a:prstGeom>
+          <a:noFill/>
+        </p:spPr>
+        <p:txBody>
+          <a:bodyPr wrap="none" rtlCol="0">
+            <a:spAutoFit/>
+          </a:bodyPr>
+          <a:lstStyle/>
+          <a:p>
+            <a:r>
+              <a:rPr lang="en-US" dirty="0"/>
+              <a:t>zip()</a:t>
+            </a:r>
+          </a:p>
+        </p:txBody>
+      </p:sp>
+      <p:sp>
+        <p:nvSpPr>
+          <p:cNvPr id="10" name="TextBox 9">
+            <a:extLst>
+              <a:ext uri="{FF2B5EF4-FFF2-40B4-BE49-F238E27FC236}">
+                <a16:creationId xmlns:a16="http://schemas.microsoft.com/office/drawing/2014/main" id="{2004BDD6-0159-9B75-DE01-816B420B63BB}"/>
+              </a:ext>
+            </a:extLst>
+          </p:cNvPr>
+          <p:cNvSpPr txBox="1"/>
+          <p:nvPr/>
+        </p:nvSpPr>
+        <p:spPr>
+          <a:xfrm>
+            <a:off x="1273918" y="3479222"/>
+            <a:ext cx="1048685" cy="369332"/>
+          </a:xfrm>
+          <a:prstGeom prst="rect">
+            <a:avLst/>
+          </a:prstGeom>
+          <a:noFill/>
+        </p:spPr>
+        <p:txBody>
+          <a:bodyPr wrap="none" rtlCol="0">
+            <a:spAutoFit/>
+          </a:bodyPr>
+          <a:lstStyle/>
+          <a:p>
+            <a:r>
+              <a:rPr lang="en-US" dirty="0" err="1"/>
+              <a:t>zipWith</a:t>
+            </a:r>
+            <a:r>
+              <a:rPr lang="en-US" dirty="0"/>
+              <a:t>()</a:t>
+            </a:r>
+          </a:p>
+        </p:txBody>
+      </p:sp>
+    </p:spTree>
+    <p:extLst>
+      <p:ext uri="{BB962C8B-B14F-4D97-AF65-F5344CB8AC3E}">
+        <p14:creationId xmlns:p14="http://schemas.microsoft.com/office/powerpoint/2010/main" val="445191236"/>
+      </p:ext>
+    </p:extLst>
+  </p:cSld>
+  <p:clrMapOvr>
+    <a:masterClrMapping/>
+  </p:clrMapOvr>
+</p:sld>
+</file>
+
 <file path=ppt/theme/theme1.xml><?xml version="1.0" encoding="utf-8"?>
 <a:theme xmlns:a="http://schemas.openxmlformats.org/drawingml/2006/main" name="Office Theme">
   <a:themeElements>

</xml_diff>